<commit_message>
Minor update to IPPM ppt
Minor update per comments from John Lemon

Signed-off-by: Frank <fbrockne@cisco.com>
</commit_message>
<xml_diff>
--- a/presentations/IETF100/IETF100-IPPM-IOAM.pptx
+++ b/presentations/IETF100/IETF100-IPPM-IOAM.pptx
@@ -300,7 +300,7 @@
               <a:pPr>
                 <a:defRPr/>
               </a:pPr>
-              <a:t>11/8/2017</a:t>
+              <a:t>11/10/2017</a:t>
             </a:fld>
             <a:endParaRPr lang="en-US"/>
           </a:p>
@@ -523,7 +523,7 @@
               <a:pPr>
                 <a:defRPr/>
               </a:pPr>
-              <a:t>11/8/2017</a:t>
+              <a:t>11/10/2017</a:t>
             </a:fld>
             <a:endParaRPr lang="en-US"/>
           </a:p>
@@ -11222,7 +11222,6 @@
               <a:rPr lang="en-US" sz="1200" dirty="0" smtClean="0"/>
               <a:t>(Broadcom)</a:t>
             </a:r>
-            <a:endParaRPr lang="en-US" sz="1200" dirty="0" smtClean="0"/>
           </a:p>
           <a:p>
             <a:pPr marL="0" indent="0">
@@ -11850,15 +11849,22 @@
             <a:endParaRPr lang="de-DE" sz="1400" dirty="0" smtClean="0"/>
           </a:p>
           <a:p>
+            <a:pPr lvl="1"/>
+            <a:r>
+              <a:rPr lang="en-US" sz="1400" dirty="0" smtClean="0"/>
+              <a:t>Extend </a:t>
+            </a:r>
+            <a:r>
+              <a:rPr lang="en-US" sz="1400" dirty="0"/>
+              <a:t>the timestamp to allow it to support both PTP and </a:t>
+            </a:r>
+            <a:r>
+              <a:rPr lang="en-US" sz="1400" dirty="0" smtClean="0"/>
+              <a:t>NTP</a:t>
+            </a:r>
+          </a:p>
+          <a:p>
             <a:pPr lvl="2"/>
-            <a:r>
-              <a:rPr lang="en-US" sz="1200" dirty="0" smtClean="0"/>
-              <a:t>Extend </a:t>
-            </a:r>
-            <a:r>
-              <a:rPr lang="en-US" sz="1200" dirty="0"/>
-              <a:t>the timestamp to allow it to support both PTP and NTP. </a:t>
-            </a:r>
             <a:r>
               <a:rPr lang="en-US" sz="1200" dirty="0" smtClean="0"/>
               <a:t>The seconds </a:t>
@@ -11881,7 +11887,22 @@
             </a:r>
             <a:r>
               <a:rPr lang="en-US" sz="1200" dirty="0"/>
-              <a:t>within the in-situ OAM domain. The datatype currently </a:t>
+              <a:t>within the in-situ OAM </a:t>
+            </a:r>
+            <a:r>
+              <a:rPr lang="en-US" sz="1200" dirty="0" smtClean="0"/>
+              <a:t>domain</a:t>
+            </a:r>
+          </a:p>
+          <a:p>
+            <a:pPr lvl="2"/>
+            <a:r>
+              <a:rPr lang="en-US" sz="1200" dirty="0" smtClean="0"/>
+              <a:t>The </a:t>
+            </a:r>
+            <a:r>
+              <a:rPr lang="en-US" sz="1200" dirty="0"/>
+              <a:t>datatype currently </a:t>
             </a:r>
             <a:r>
               <a:rPr lang="en-US" sz="1200" dirty="0" smtClean="0"/>
@@ -11911,31 +11932,27 @@
               <a:rPr lang="en-US" sz="1200" dirty="0" smtClean="0"/>
               <a:t>respectively</a:t>
             </a:r>
+          </a:p>
+          <a:p>
+            <a:pPr lvl="1"/>
+            <a:r>
+              <a:rPr lang="en-US" sz="1400" dirty="0" smtClean="0"/>
+              <a:t>Change current timestamp related code points for IOAM-Trace-Type and add two new ones:</a:t>
+            </a:r>
+            <a:endParaRPr lang="en-US" sz="1400" dirty="0"/>
+          </a:p>
+          <a:p>
+            <a:pPr lvl="2"/>
             <a:r>
               <a:rPr lang="en-US" sz="1200" dirty="0" smtClean="0"/>
-              <a:t>.</a:t>
-            </a:r>
-          </a:p>
-          <a:p>
-            <a:pPr lvl="2"/>
-            <a:r>
-              <a:rPr lang="en-US" sz="1200" dirty="0" smtClean="0"/>
-              <a:t>Change current timestamp related code points for IOAM-Trace-Type and add two new ones:</a:t>
-            </a:r>
-            <a:endParaRPr lang="en-US" sz="1200" dirty="0"/>
-          </a:p>
-          <a:p>
-            <a:pPr lvl="3"/>
-            <a:r>
-              <a:rPr lang="en-US" sz="1000" dirty="0" smtClean="0"/>
               <a:t>CHANGE: Bit </a:t>
             </a:r>
             <a:r>
-              <a:rPr lang="en-US" sz="1000" dirty="0"/>
+              <a:rPr lang="en-US" sz="1200" dirty="0"/>
               <a:t>2    When set indicates presence of </a:t>
             </a:r>
             <a:r>
-              <a:rPr lang="en-US" sz="1000" dirty="0" smtClean="0">
+              <a:rPr lang="en-US" sz="1200" dirty="0" smtClean="0">
                 <a:solidFill>
                   <a:srgbClr val="FF0000"/>
                 </a:solidFill>
@@ -11943,30 +11960,30 @@
               <a:t>PTP</a:t>
             </a:r>
             <a:r>
-              <a:rPr lang="en-US" sz="1000" dirty="0" smtClean="0"/>
+              <a:rPr lang="en-US" sz="1200" dirty="0" smtClean="0"/>
               <a:t> timestamp </a:t>
             </a:r>
             <a:r>
-              <a:rPr lang="en-US" sz="1000" dirty="0"/>
+              <a:rPr lang="en-US" sz="1200" dirty="0"/>
               <a:t>seconds in </a:t>
             </a:r>
             <a:r>
-              <a:rPr lang="en-US" sz="1000" dirty="0" smtClean="0"/>
-              <a:t>the node data.</a:t>
-            </a:r>
-          </a:p>
-          <a:p>
-            <a:pPr lvl="3"/>
-            <a:r>
-              <a:rPr lang="en-US" sz="1000" dirty="0" smtClean="0"/>
+              <a:rPr lang="en-US" sz="1200" dirty="0" smtClean="0"/>
+              <a:t>the node data</a:t>
+            </a:r>
+          </a:p>
+          <a:p>
+            <a:pPr lvl="2"/>
+            <a:r>
+              <a:rPr lang="en-US" sz="1200" dirty="0" smtClean="0"/>
               <a:t>CHANGE: Bit </a:t>
             </a:r>
             <a:r>
-              <a:rPr lang="en-US" sz="1000" dirty="0"/>
+              <a:rPr lang="en-US" sz="1200" dirty="0"/>
               <a:t>3    When set indicates presence of </a:t>
             </a:r>
             <a:r>
-              <a:rPr lang="en-US" sz="1000" dirty="0" smtClean="0">
+              <a:rPr lang="en-US" sz="1200" dirty="0" smtClean="0">
                 <a:solidFill>
                   <a:srgbClr val="FF0000"/>
                 </a:solidFill>
@@ -11974,38 +11991,46 @@
               <a:t>PTP</a:t>
             </a:r>
             <a:r>
-              <a:rPr lang="en-US" sz="1000" dirty="0" smtClean="0"/>
+              <a:rPr lang="en-US" sz="1200" dirty="0" smtClean="0"/>
               <a:t> timestamp </a:t>
             </a:r>
             <a:r>
-              <a:rPr lang="en-US" sz="1000" dirty="0"/>
+              <a:rPr lang="en-US" sz="1200" dirty="0"/>
               <a:t>nanoseconds </a:t>
             </a:r>
             <a:r>
-              <a:rPr lang="en-US" sz="1000" dirty="0" smtClean="0"/>
+              <a:rPr lang="en-US" sz="1200" dirty="0" smtClean="0"/>
               <a:t>in the </a:t>
             </a:r>
             <a:r>
-              <a:rPr lang="en-US" sz="1000" dirty="0"/>
-              <a:t>node data</a:t>
-            </a:r>
-            <a:r>
-              <a:rPr lang="en-US" sz="1000" dirty="0" smtClean="0"/>
-              <a:t>.</a:t>
-            </a:r>
-          </a:p>
-          <a:p>
-            <a:pPr lvl="3"/>
-            <a:r>
-              <a:rPr lang="en-US" sz="1000" dirty="0" smtClean="0"/>
+              <a:rPr lang="en-US" sz="1200" dirty="0"/>
+              <a:t>node </a:t>
+            </a:r>
+            <a:r>
+              <a:rPr lang="en-US" sz="1200" dirty="0" smtClean="0"/>
+              <a:t>data</a:t>
+            </a:r>
+          </a:p>
+          <a:p>
+            <a:pPr lvl="2"/>
+            <a:r>
+              <a:rPr lang="en-US" sz="1200" dirty="0" smtClean="0"/>
               <a:t>NEW: Bit 12 </a:t>
             </a:r>
             <a:r>
-              <a:rPr lang="en-US" sz="1000" dirty="0"/>
-              <a:t>When set indicates presence of </a:t>
-            </a:r>
-            <a:r>
-              <a:rPr lang="en-US" sz="1000" dirty="0" smtClean="0">
+              <a:rPr lang="en-US" sz="1200" dirty="0"/>
+              <a:t> </a:t>
+            </a:r>
+            <a:r>
+              <a:rPr lang="en-US" sz="1200" dirty="0" smtClean="0"/>
+              <a:t>       When </a:t>
+            </a:r>
+            <a:r>
+              <a:rPr lang="en-US" sz="1200" dirty="0"/>
+              <a:t>set indicates presence of </a:t>
+            </a:r>
+            <a:r>
+              <a:rPr lang="en-US" sz="1200" dirty="0" smtClean="0">
                 <a:solidFill>
                   <a:srgbClr val="FF0000"/>
                 </a:solidFill>
@@ -12013,31 +12038,31 @@
               <a:t>NTP</a:t>
             </a:r>
             <a:r>
-              <a:rPr lang="en-US" sz="1000" dirty="0" smtClean="0"/>
+              <a:rPr lang="en-US" sz="1200" dirty="0" smtClean="0"/>
               <a:t> </a:t>
             </a:r>
             <a:r>
-              <a:rPr lang="en-US" sz="1000" dirty="0"/>
-              <a:t>timestamp seconds in the node data</a:t>
-            </a:r>
-            <a:r>
-              <a:rPr lang="en-US" sz="1000" dirty="0" smtClean="0"/>
-              <a:t>.</a:t>
-            </a:r>
-            <a:endParaRPr lang="en-US" sz="1000" dirty="0"/>
-          </a:p>
-          <a:p>
-            <a:pPr lvl="3"/>
-            <a:r>
-              <a:rPr lang="en-US" sz="1000" dirty="0" smtClean="0"/>
-              <a:t>NEW: Bit 13 </a:t>
-            </a:r>
-            <a:r>
-              <a:rPr lang="en-US" sz="1000" dirty="0"/>
-              <a:t>When set indicates presence of </a:t>
-            </a:r>
-            <a:r>
-              <a:rPr lang="en-US" sz="1000" dirty="0" smtClean="0">
+              <a:rPr lang="en-US" sz="1200" dirty="0"/>
+              <a:t>timestamp seconds in the node </a:t>
+            </a:r>
+            <a:r>
+              <a:rPr lang="en-US" sz="1200" dirty="0" smtClean="0"/>
+              <a:t>data</a:t>
+            </a:r>
+            <a:endParaRPr lang="en-US" sz="1200" dirty="0"/>
+          </a:p>
+          <a:p>
+            <a:pPr lvl="2"/>
+            <a:r>
+              <a:rPr lang="en-US" sz="1200" dirty="0" smtClean="0"/>
+              <a:t>NEW: Bit 13         When </a:t>
+            </a:r>
+            <a:r>
+              <a:rPr lang="en-US" sz="1200" dirty="0"/>
+              <a:t>set indicates presence of </a:t>
+            </a:r>
+            <a:r>
+              <a:rPr lang="en-US" sz="1200" dirty="0" smtClean="0">
                 <a:solidFill>
                   <a:srgbClr val="FF0000"/>
                 </a:solidFill>
@@ -12045,24 +12070,24 @@
               <a:t>NTP</a:t>
             </a:r>
             <a:r>
-              <a:rPr lang="en-US" sz="1000" dirty="0" smtClean="0"/>
+              <a:rPr lang="en-US" sz="1200" dirty="0" smtClean="0"/>
               <a:t> </a:t>
             </a:r>
             <a:r>
-              <a:rPr lang="en-US" sz="1000" dirty="0"/>
+              <a:rPr lang="en-US" sz="1200" dirty="0"/>
               <a:t>timestamp </a:t>
             </a:r>
             <a:r>
-              <a:rPr lang="en-US" sz="1000" dirty="0" smtClean="0"/>
+              <a:rPr lang="en-US" sz="1200" dirty="0" smtClean="0"/>
               <a:t>fractional seconds </a:t>
             </a:r>
             <a:r>
-              <a:rPr lang="en-US" sz="1000" dirty="0"/>
-              <a:t>in the node data</a:t>
-            </a:r>
-            <a:r>
-              <a:rPr lang="en-US" sz="1000" dirty="0" smtClean="0"/>
-              <a:t>.</a:t>
+              <a:rPr lang="en-US" sz="1200" dirty="0"/>
+              <a:t>in the node </a:t>
+            </a:r>
+            <a:r>
+              <a:rPr lang="en-US" sz="1200" dirty="0" smtClean="0"/>
+              <a:t>data</a:t>
             </a:r>
           </a:p>
         </p:txBody>
@@ -12165,10 +12190,25 @@
             <a:endParaRPr lang="de-DE" sz="1600" dirty="0" smtClean="0"/>
           </a:p>
           <a:p>
+            <a:pPr lvl="1"/>
+            <a:r>
+              <a:rPr lang="en-US" sz="1400" dirty="0"/>
+              <a:t>Add a few Edge-To-Edge data </a:t>
+            </a:r>
+            <a:r>
+              <a:rPr lang="en-US" sz="1400" dirty="0" smtClean="0"/>
+              <a:t>types</a:t>
+            </a:r>
+          </a:p>
+          <a:p>
             <a:pPr lvl="2"/>
             <a:r>
+              <a:rPr lang="en-US" sz="1200" dirty="0" smtClean="0"/>
+              <a:t>In </a:t>
+            </a:r>
+            <a:r>
               <a:rPr lang="en-US" sz="1200" dirty="0"/>
-              <a:t>Add a few Edge-To-Edge data types. In addition to the </a:t>
+              <a:t>addition to the </a:t>
             </a:r>
             <a:r>
               <a:rPr lang="en-US" sz="1200" dirty="0" smtClean="0"/>
@@ -12176,27 +12216,38 @@
             </a:r>
             <a:r>
               <a:rPr lang="en-US" sz="1200" dirty="0"/>
-              <a:t>64-bit sequence number, it would be handy to be able to send </a:t>
+              <a:t>64-bit sequence </a:t>
             </a:r>
             <a:r>
               <a:rPr lang="en-US" sz="1200" dirty="0" smtClean="0"/>
-              <a:t>a sequence </a:t>
+              <a:t>number, add a sequence </a:t>
             </a:r>
             <a:r>
               <a:rPr lang="en-US" sz="1200" dirty="0"/>
-              <a:t>number taking up only 32 bits. And it would be useful to be </a:t>
+              <a:t>number taking up only 32 </a:t>
             </a:r>
             <a:r>
               <a:rPr lang="en-US" sz="1200" dirty="0" smtClean="0"/>
-              <a:t>able to </a:t>
+              <a:t>bits</a:t>
+            </a:r>
+          </a:p>
+          <a:p>
+            <a:pPr lvl="2"/>
+            <a:r>
+              <a:rPr lang="en-US" sz="1200" dirty="0" smtClean="0"/>
+              <a:t>Add same timestamp types as used by Hop-By-Hop to measure </a:t>
             </a:r>
             <a:r>
               <a:rPr lang="en-US" sz="1200" dirty="0"/>
-              <a:t>measure delay (and delay variation) across the entire path, </a:t>
+              <a:t>delay (and delay variation) across the entire </a:t>
             </a:r>
             <a:r>
               <a:rPr lang="en-US" sz="1200" dirty="0" smtClean="0"/>
-              <a:t>without having </a:t>
+              <a:t>path, without </a:t>
+            </a:r>
+            <a:r>
+              <a:rPr lang="en-US" sz="1200" dirty="0" smtClean="0"/>
+              <a:t>having </a:t>
             </a:r>
             <a:r>
               <a:rPr lang="en-US" sz="1200" dirty="0"/>
@@ -12205,10 +12256,6 @@
             <a:r>
               <a:rPr lang="en-US" sz="1200" dirty="0" smtClean="0"/>
               <a:t>the path</a:t>
-            </a:r>
-            <a:r>
-              <a:rPr lang="en-US" sz="1200" dirty="0"/>
-              <a:t>.</a:t>
             </a:r>
             <a:endParaRPr lang="de-DE" sz="1200" dirty="0"/>
           </a:p>

</xml_diff>

<commit_message>
Clarify O-bit change and add undefined bits issue
Clarify what changed with regard to the transit delay O-bit
Add issue for undefined IOAM-Trace-Type bits, forward compatibility
</commit_message>
<xml_diff>
--- a/presentations/IETF100/IETF100-IPPM-IOAM.pptx
+++ b/presentations/IETF100/IETF100-IPPM-IOAM.pptx
@@ -5,10 +5,10 @@
     <p:sldMasterId id="2147483700" r:id="rId1"/>
   </p:sldMasterIdLst>
   <p:notesMasterIdLst>
-    <p:notesMasterId r:id="rId7"/>
+    <p:notesMasterId r:id="rId8"/>
   </p:notesMasterIdLst>
   <p:handoutMasterIdLst>
-    <p:handoutMasterId r:id="rId8"/>
+    <p:handoutMasterId r:id="rId9"/>
   </p:handoutMasterIdLst>
   <p:sldIdLst>
     <p:sldId id="457" r:id="rId2"/>
@@ -16,6 +16,7 @@
     <p:sldId id="667" r:id="rId4"/>
     <p:sldId id="666" r:id="rId5"/>
     <p:sldId id="668" r:id="rId6"/>
+    <p:sldId id="669" r:id="rId7"/>
   </p:sldIdLst>
   <p:sldSz cx="9144000" cy="5143500" type="screen16x9"/>
   <p:notesSz cx="6858000" cy="9144000"/>
@@ -300,7 +301,7 @@
               <a:pPr>
                 <a:defRPr/>
               </a:pPr>
-              <a:t>11/10/2017</a:t>
+              <a:t>11/13/17</a:t>
             </a:fld>
             <a:endParaRPr lang="en-US"/>
           </a:p>
@@ -523,7 +524,7 @@
               <a:pPr>
                 <a:defRPr/>
               </a:pPr>
-              <a:t>11/10/2017</a:t>
+              <a:t>11/13/17</a:t>
             </a:fld>
             <a:endParaRPr lang="en-US"/>
           </a:p>
@@ -1569,7 +1570,7 @@
               </a14:hiddenLine>
             </a:ext>
             <a:ext uri="{FAA26D3D-D897-4be2-8F04-BA451C77F1D7}">
-              <ma14:placeholderFlag xmlns:ma14="http://schemas.microsoft.com/office/mac/drawingml/2011/main" xmlns="" val="1"/>
+              <ma14:placeholderFlag xmlns:ma14="http://schemas.microsoft.com/office/mac/drawingml/2011/main" val="1"/>
             </a:ext>
           </a:extLst>
         </p:spPr>
@@ -1964,7 +1965,7 @@
               </a14:hiddenLine>
             </a:ext>
             <a:ext uri="{FAA26D3D-D897-4be2-8F04-BA451C77F1D7}">
-              <ma14:placeholderFlag xmlns:ma14="http://schemas.microsoft.com/office/mac/drawingml/2011/main" xmlns="" val="1"/>
+              <ma14:placeholderFlag xmlns:ma14="http://schemas.microsoft.com/office/mac/drawingml/2011/main" val="1"/>
             </a:ext>
           </a:extLst>
         </p:spPr>
@@ -3627,7 +3628,7 @@
               </a14:hiddenLine>
             </a:ext>
             <a:ext uri="{FAA26D3D-D897-4be2-8F04-BA451C77F1D7}">
-              <ma14:placeholderFlag xmlns:ma14="http://schemas.microsoft.com/office/mac/drawingml/2011/main" xmlns="" val="1"/>
+              <ma14:placeholderFlag xmlns:ma14="http://schemas.microsoft.com/office/mac/drawingml/2011/main" val="1"/>
             </a:ext>
           </a:extLst>
         </p:spPr>
@@ -3722,7 +3723,7 @@
               </a14:hiddenLine>
             </a:ext>
             <a:ext uri="{FAA26D3D-D897-4be2-8F04-BA451C77F1D7}">
-              <ma14:placeholderFlag xmlns:ma14="http://schemas.microsoft.com/office/mac/drawingml/2011/main" xmlns="" val="1"/>
+              <ma14:placeholderFlag xmlns:ma14="http://schemas.microsoft.com/office/mac/drawingml/2011/main" val="1"/>
             </a:ext>
           </a:extLst>
         </p:spPr>
@@ -4256,7 +4257,7 @@
               </a14:hiddenLine>
             </a:ext>
             <a:ext uri="{FAA26D3D-D897-4be2-8F04-BA451C77F1D7}">
-              <ma14:placeholderFlag xmlns:ma14="http://schemas.microsoft.com/office/mac/drawingml/2011/main" xmlns="" val="1"/>
+              <ma14:placeholderFlag xmlns:ma14="http://schemas.microsoft.com/office/mac/drawingml/2011/main" val="1"/>
             </a:ext>
           </a:extLst>
         </p:spPr>
@@ -4466,7 +4467,7 @@
               </a14:hiddenLine>
             </a:ext>
             <a:ext uri="{FAA26D3D-D897-4be2-8F04-BA451C77F1D7}">
-              <ma14:placeholderFlag xmlns:ma14="http://schemas.microsoft.com/office/mac/drawingml/2011/main" xmlns="" val="1"/>
+              <ma14:placeholderFlag xmlns:ma14="http://schemas.microsoft.com/office/mac/drawingml/2011/main" val="1"/>
             </a:ext>
           </a:extLst>
         </p:spPr>
@@ -5037,7 +5038,7 @@
               </a14:hiddenLine>
             </a:ext>
             <a:ext uri="{FAA26D3D-D897-4be2-8F04-BA451C77F1D7}">
-              <ma14:placeholderFlag xmlns:ma14="http://schemas.microsoft.com/office/mac/drawingml/2011/main" xmlns="" val="1"/>
+              <ma14:placeholderFlag xmlns:ma14="http://schemas.microsoft.com/office/mac/drawingml/2011/main" val="1"/>
             </a:ext>
           </a:extLst>
         </p:spPr>
@@ -5257,7 +5258,7 @@
               </a14:hiddenLine>
             </a:ext>
             <a:ext uri="{FAA26D3D-D897-4be2-8F04-BA451C77F1D7}">
-              <ma14:placeholderFlag xmlns:ma14="http://schemas.microsoft.com/office/mac/drawingml/2011/main" xmlns="" val="1"/>
+              <ma14:placeholderFlag xmlns:ma14="http://schemas.microsoft.com/office/mac/drawingml/2011/main" val="1"/>
             </a:ext>
           </a:extLst>
         </p:spPr>
@@ -6107,7 +6108,7 @@
               </a14:hiddenLine>
             </a:ext>
             <a:ext uri="{FAA26D3D-D897-4be2-8F04-BA451C77F1D7}">
-              <ma14:placeholderFlag xmlns:ma14="http://schemas.microsoft.com/office/mac/drawingml/2011/main" xmlns="" val="1"/>
+              <ma14:placeholderFlag xmlns:ma14="http://schemas.microsoft.com/office/mac/drawingml/2011/main" val="1"/>
             </a:ext>
           </a:extLst>
         </p:spPr>
@@ -9548,7 +9549,7 @@
               </a14:hiddenLine>
             </a:ext>
             <a:ext uri="{FAA26D3D-D897-4be2-8F04-BA451C77F1D7}">
-              <ma14:placeholderFlag xmlns:ma14="http://schemas.microsoft.com/office/mac/drawingml/2011/main" xmlns="" val="1"/>
+              <ma14:placeholderFlag xmlns:ma14="http://schemas.microsoft.com/office/mac/drawingml/2011/main" val="1"/>
             </a:ext>
           </a:extLst>
         </p:spPr>
@@ -9764,7 +9765,7 @@
               </a14:hiddenLine>
             </a:ext>
             <a:ext uri="{FAA26D3D-D897-4be2-8F04-BA451C77F1D7}">
-              <ma14:placeholderFlag xmlns:ma14="http://schemas.microsoft.com/office/mac/drawingml/2011/main" xmlns="" val="1"/>
+              <ma14:placeholderFlag xmlns:ma14="http://schemas.microsoft.com/office/mac/drawingml/2011/main" val="1"/>
             </a:ext>
           </a:extLst>
         </p:spPr>
@@ -9980,7 +9981,7 @@
               </a14:hiddenLine>
             </a:ext>
             <a:ext uri="{FAA26D3D-D897-4be2-8F04-BA451C77F1D7}">
-              <ma14:placeholderFlag xmlns:ma14="http://schemas.microsoft.com/office/mac/drawingml/2011/main" xmlns="" val="1"/>
+              <ma14:placeholderFlag xmlns:ma14="http://schemas.microsoft.com/office/mac/drawingml/2011/main" val="1"/>
             </a:ext>
           </a:extLst>
         </p:spPr>
@@ -10391,7 +10392,7 @@
               </a14:hiddenLine>
             </a:ext>
             <a:ext uri="{FAA26D3D-D897-4be2-8F04-BA451C77F1D7}">
-              <ma14:placeholderFlag xmlns:ma14="http://schemas.microsoft.com/office/mac/drawingml/2011/main" xmlns="" val="1"/>
+              <ma14:placeholderFlag xmlns:ma14="http://schemas.microsoft.com/office/mac/drawingml/2011/main" val="1"/>
             </a:ext>
           </a:extLst>
         </p:spPr>
@@ -11310,7 +11311,7 @@
                   </a:schemeClr>
                 </a:solidFill>
               </a:rPr>
-              <a:t>Overflow </a:t>
+              <a:t>Transit Delay Overflow </a:t>
             </a:r>
             <a:r>
               <a:rPr lang="en-US" sz="1600" dirty="0">
@@ -11330,8 +11331,15 @@
                   </a:schemeClr>
                 </a:solidFill>
               </a:rPr>
-              <a:t>value for time data fields</a:t>
-            </a:r>
+              <a:t>value</a:t>
+            </a:r>
+            <a:endParaRPr lang="en-US" sz="1600" dirty="0" smtClean="0">
+              <a:solidFill>
+                <a:schemeClr val="tx1">
+                  <a:lumMod val="50000"/>
+                </a:schemeClr>
+              </a:solidFill>
+            </a:endParaRPr>
           </a:p>
           <a:p>
             <a:pPr lvl="1"/>
@@ -11343,20 +11351,43 @@
                   </a:schemeClr>
                 </a:solidFill>
               </a:rPr>
-              <a:t>“If </a:t>
-            </a:r>
-            <a:r>
-              <a:rPr lang="en-US" sz="1400" dirty="0">
+              <a:t>Clarify range and distinguish Overflow encoded value from Not Populated encoded value</a:t>
+            </a:r>
+          </a:p>
+          <a:p>
+            <a:pPr lvl="2"/>
+            <a:r>
+              <a:rPr lang="en-US" sz="1200" dirty="0" smtClean="0">
                 <a:solidFill>
                   <a:schemeClr val="tx1">
                     <a:lumMod val="50000"/>
                   </a:schemeClr>
                 </a:solidFill>
               </a:rPr>
+              <a:t>“</a:t>
+            </a:r>
+            <a:r>
+              <a:rPr lang="en-US" sz="1200" dirty="0" smtClean="0">
+                <a:solidFill>
+                  <a:schemeClr val="tx1">
+                    <a:lumMod val="50000"/>
+                  </a:schemeClr>
+                </a:solidFill>
+              </a:rPr>
+              <a:t>If </a:t>
+            </a:r>
+            <a:r>
+              <a:rPr lang="en-US" sz="1200" dirty="0">
+                <a:solidFill>
+                  <a:schemeClr val="tx1">
+                    <a:lumMod val="50000"/>
+                  </a:schemeClr>
+                </a:solidFill>
+              </a:rPr>
               <a:t>the transit delay exceeds 2^31-1 nanoseconds then the top bit 'O' is set to indicate overflow and value set to </a:t>
             </a:r>
             <a:r>
-              <a:rPr lang="en-US" sz="1400" dirty="0" smtClean="0">
+              <a:rPr lang="en-US" sz="1200" dirty="0" smtClean="0">
                 <a:solidFill>
                   <a:schemeClr val="tx1">
                     <a:lumMod val="50000"/>
@@ -12243,11 +12274,7 @@
             </a:r>
             <a:r>
               <a:rPr lang="en-US" sz="1200" dirty="0" smtClean="0"/>
-              <a:t>path, without </a:t>
-            </a:r>
-            <a:r>
-              <a:rPr lang="en-US" sz="1200" dirty="0" smtClean="0"/>
-              <a:t>having </a:t>
+              <a:t>path, without having </a:t>
             </a:r>
             <a:r>
               <a:rPr lang="en-US" sz="1200" dirty="0"/>
@@ -12288,6 +12315,219 @@
     <p:extLst>
       <p:ext uri="{BB962C8B-B14F-4D97-AF65-F5344CB8AC3E}">
         <p14:creationId xmlns:p14="http://schemas.microsoft.com/office/powerpoint/2010/main" val="1111704633"/>
+      </p:ext>
+    </p:extLst>
+  </p:cSld>
+  <p:clrMapOvr>
+    <a:masterClrMapping/>
+  </p:clrMapOvr>
+  <p:transition spd="med">
+    <p:fade/>
+  </p:transition>
+</p:sld>
+</file>
+
+<file path=ppt/slides/slide6.xml><?xml version="1.0" encoding="utf-8"?>
+<p:sld xmlns:a="http://schemas.openxmlformats.org/drawingml/2006/main" xmlns:r="http://schemas.openxmlformats.org/officeDocument/2006/relationships" xmlns:p="http://schemas.openxmlformats.org/presentationml/2006/main">
+  <p:cSld>
+    <p:spTree>
+      <p:nvGrpSpPr>
+        <p:cNvPr id="1" name=""/>
+        <p:cNvGrpSpPr/>
+        <p:nvPr/>
+      </p:nvGrpSpPr>
+      <p:grpSpPr>
+        <a:xfrm>
+          <a:off x="0" y="0"/>
+          <a:ext cx="0" cy="0"/>
+          <a:chOff x="0" y="0"/>
+          <a:chExt cx="0" cy="0"/>
+        </a:xfrm>
+      </p:grpSpPr>
+      <p:sp>
+        <p:nvSpPr>
+          <p:cNvPr id="2" name="Text Placeholder 1"/>
+          <p:cNvSpPr>
+            <a:spLocks noGrp="1"/>
+          </p:cNvSpPr>
+          <p:nvPr>
+            <p:ph type="body" sz="quarter" idx="10"/>
+          </p:nvPr>
+        </p:nvSpPr>
+        <p:spPr/>
+        <p:txBody>
+          <a:bodyPr/>
+          <a:lstStyle/>
+          <a:p>
+            <a:r>
+              <a:rPr lang="en-US" sz="1600" dirty="0" smtClean="0"/>
+              <a:t>Undefined IOAM-Trace-Type bits forward compatibility</a:t>
+            </a:r>
+          </a:p>
+          <a:p>
+            <a:pPr lvl="1"/>
+            <a:r>
+              <a:rPr lang="en-US" sz="1400" dirty="0" smtClean="0"/>
+              <a:t>Proposed by </a:t>
+            </a:r>
+            <a:r>
+              <a:rPr lang="en-US" sz="1400" dirty="0"/>
+              <a:t>Mickey Spiegel</a:t>
+            </a:r>
+            <a:br>
+              <a:rPr lang="en-US" sz="1400" dirty="0"/>
+            </a:br>
+            <a:r>
+              <a:rPr lang="en-US" sz="1400" dirty="0">
+                <a:hlinkClick r:id="rId2"/>
+              </a:rPr>
+              <a:t>https://</a:t>
+            </a:r>
+            <a:r>
+              <a:rPr lang="en-US" sz="1400" dirty="0" err="1">
+                <a:hlinkClick r:id="rId2"/>
+              </a:rPr>
+              <a:t>github.com</a:t>
+            </a:r>
+            <a:r>
+              <a:rPr lang="en-US" sz="1400" dirty="0">
+                <a:hlinkClick r:id="rId2"/>
+              </a:rPr>
+              <a:t>/</a:t>
+            </a:r>
+            <a:r>
+              <a:rPr lang="en-US" sz="1400" dirty="0" err="1">
+                <a:hlinkClick r:id="rId2"/>
+              </a:rPr>
+              <a:t>inband-oam</a:t>
+            </a:r>
+            <a:r>
+              <a:rPr lang="en-US" sz="1400" dirty="0">
+                <a:hlinkClick r:id="rId2"/>
+              </a:rPr>
+              <a:t>/</a:t>
+            </a:r>
+            <a:r>
+              <a:rPr lang="en-US" sz="1400" dirty="0" err="1">
+                <a:hlinkClick r:id="rId2"/>
+              </a:rPr>
+              <a:t>ietf</a:t>
+            </a:r>
+            <a:r>
+              <a:rPr lang="en-US" sz="1400" dirty="0">
+                <a:hlinkClick r:id="rId2"/>
+              </a:rPr>
+              <a:t>/issues/63</a:t>
+            </a:r>
+            <a:endParaRPr lang="en-US" sz="1400" dirty="0" smtClean="0"/>
+          </a:p>
+          <a:p>
+            <a:pPr lvl="1"/>
+            <a:r>
+              <a:rPr lang="en-US" sz="1400" dirty="0" smtClean="0"/>
+              <a:t>We </a:t>
+            </a:r>
+            <a:r>
+              <a:rPr lang="en-US" sz="1400" dirty="0"/>
+              <a:t>need to specify required behavior when receiving a packet with one or more of the undefined IOAM-Trace-Type bits </a:t>
+            </a:r>
+            <a:r>
+              <a:rPr lang="en-US" sz="1400" dirty="0" smtClean="0"/>
+              <a:t>set</a:t>
+            </a:r>
+          </a:p>
+          <a:p>
+            <a:pPr lvl="2"/>
+            <a:r>
+              <a:rPr lang="en-US" sz="1200" dirty="0"/>
+              <a:t>I</a:t>
+            </a:r>
+            <a:r>
+              <a:rPr lang="en-US" sz="1200" dirty="0" smtClean="0"/>
+              <a:t>f not specified any </a:t>
+            </a:r>
+            <a:r>
+              <a:rPr lang="en-US" sz="1200" dirty="0"/>
+              <a:t>future use of these bits will break backwards compatibility, making it impossible to parse the IOAM Trace Option correctly.</a:t>
+            </a:r>
+          </a:p>
+          <a:p>
+            <a:pPr lvl="1"/>
+            <a:r>
+              <a:rPr lang="en-US" sz="1400" dirty="0"/>
+              <a:t>T</a:t>
+            </a:r>
+            <a:r>
+              <a:rPr lang="en-US" sz="1400" dirty="0" smtClean="0"/>
+              <a:t>wo </a:t>
+            </a:r>
+            <a:r>
+              <a:rPr lang="en-US" sz="1400" dirty="0"/>
+              <a:t>possible approaches:</a:t>
+            </a:r>
+          </a:p>
+          <a:p>
+            <a:pPr lvl="2"/>
+            <a:r>
+              <a:rPr lang="en-US" sz="1200" dirty="0"/>
+              <a:t>A node receiving a packet with one or more of the undefined IOAM-Trace-Type bits set must not add any data fields to that IOAM Trace Option.</a:t>
+            </a:r>
+          </a:p>
+          <a:p>
+            <a:pPr lvl="2"/>
+            <a:r>
+              <a:rPr lang="en-US" sz="1200" dirty="0"/>
+              <a:t>The size of the data field associated with each undefined bit must be determined now. A node receiving a packet with one or more of the undefined IOAM-Trace-</a:t>
+            </a:r>
+            <a:r>
+              <a:rPr lang="en-US" sz="1200" dirty="0" err="1"/>
+              <a:t>Tye</a:t>
+            </a:r>
+            <a:r>
+              <a:rPr lang="en-US" sz="1200" dirty="0"/>
+              <a:t> bits set must add a data field of the corresponding size filled with "0xFF" in each octet.</a:t>
+            </a:r>
+          </a:p>
+          <a:p>
+            <a:pPr lvl="1"/>
+            <a:r>
+              <a:rPr lang="en-US" sz="1400" dirty="0"/>
+              <a:t>Any node adding an IOAM Trace Option must set all IOAM-Trace-Type undefined bits to 0.</a:t>
+            </a:r>
+          </a:p>
+          <a:p>
+            <a:pPr lvl="1"/>
+            <a:endParaRPr lang="en-US" dirty="0"/>
+          </a:p>
+        </p:txBody>
+      </p:sp>
+      <p:sp>
+        <p:nvSpPr>
+          <p:cNvPr id="3" name="Title 2"/>
+          <p:cNvSpPr>
+            <a:spLocks noGrp="1"/>
+          </p:cNvSpPr>
+          <p:nvPr>
+            <p:ph type="title"/>
+          </p:nvPr>
+        </p:nvSpPr>
+        <p:spPr/>
+        <p:txBody>
+          <a:bodyPr/>
+          <a:lstStyle/>
+          <a:p>
+            <a:r>
+              <a:rPr lang="en-US" dirty="0" smtClean="0"/>
+              <a:t>Discussion topics</a:t>
+            </a:r>
+            <a:endParaRPr lang="en-US" dirty="0"/>
+          </a:p>
+        </p:txBody>
+      </p:sp>
+    </p:spTree>
+    <p:extLst>
+      <p:ext uri="{BB962C8B-B14F-4D97-AF65-F5344CB8AC3E}">
+        <p14:creationId xmlns:p14="http://schemas.microsoft.com/office/powerpoint/2010/main" val="2093829662"/>
       </p:ext>
     </p:extLst>
   </p:cSld>

</xml_diff>